<commit_message>
updates based on feedback
</commit_message>
<xml_diff>
--- a/JWT, Angular5, WebAPI.pptx
+++ b/JWT, Angular5, WebAPI.pptx
@@ -9,13 +9,14 @@
     <p:sldId id="281" r:id="rId7"/>
     <p:sldId id="287" r:id="rId8"/>
     <p:sldId id="263" r:id="rId9"/>
-    <p:sldId id="280" r:id="rId10"/>
-    <p:sldId id="282" r:id="rId11"/>
-    <p:sldId id="286" r:id="rId12"/>
-    <p:sldId id="285" r:id="rId13"/>
-    <p:sldId id="283" r:id="rId14"/>
-    <p:sldId id="284" r:id="rId15"/>
-    <p:sldId id="257" r:id="rId16"/>
+    <p:sldId id="288" r:id="rId10"/>
+    <p:sldId id="280" r:id="rId11"/>
+    <p:sldId id="282" r:id="rId12"/>
+    <p:sldId id="286" r:id="rId13"/>
+    <p:sldId id="285" r:id="rId14"/>
+    <p:sldId id="283" r:id="rId15"/>
+    <p:sldId id="284" r:id="rId16"/>
+    <p:sldId id="257" r:id="rId17"/>
   </p:sldIdLst>
   <p:sldSz cx="9144000" cy="6858000" type="screen4x3"/>
   <p:notesSz cx="6858000" cy="9144000"/>
@@ -153,6 +154,7 @@
             <p14:sldId id="281"/>
             <p14:sldId id="287"/>
             <p14:sldId id="263"/>
+            <p14:sldId id="288"/>
             <p14:sldId id="280"/>
             <p14:sldId id="282"/>
             <p14:sldId id="286"/>
@@ -9706,7 +9708,7 @@
               <a:pPr>
                 <a:defRPr/>
               </a:pPr>
-              <a:t>9/5/2018</a:t>
+              <a:t>9/12/2018</a:t>
             </a:fld>
             <a:endParaRPr lang="en-US"/>
           </a:p>
@@ -10369,7 +10371,7 @@
           <a:p>
             <a:r>
               <a:rPr lang="en-US" dirty="0"/>
-              <a:t>Links</a:t>
+              <a:t>Other security to consider</a:t>
             </a:r>
           </a:p>
         </p:txBody>
@@ -10395,7 +10397,7 @@
             </a:pPr>
             <a:r>
               <a:rPr lang="en-US" dirty="0"/>
-              <a:t>Definition</a:t>
+              <a:t>Logical security in UI and API</a:t>
             </a:r>
           </a:p>
           <a:p>
@@ -10405,9 +10407,83 @@
             </a:pPr>
             <a:r>
               <a:rPr lang="en-US" dirty="0"/>
-              <a:t>https://tools.ietf.org/html/draft-ietf-oauth-json-web-token-07</a:t>
-            </a:r>
-          </a:p>
+              <a:t>/customer/1234/order/4567</a:t>
+            </a:r>
+          </a:p>
+          <a:p>
+            <a:pPr marL="0" indent="0">
+              <a:buNone/>
+            </a:pPr>
+            <a:endParaRPr lang="en-US" dirty="0"/>
+          </a:p>
+        </p:txBody>
+      </p:sp>
+    </p:spTree>
+    <p:extLst>
+      <p:ext uri="{BB962C8B-B14F-4D97-AF65-F5344CB8AC3E}">
+        <p14:creationId xmlns:p14="http://schemas.microsoft.com/office/powerpoint/2010/main" val="4085759445"/>
+      </p:ext>
+    </p:extLst>
+  </p:cSld>
+  <p:clrMapOvr>
+    <a:masterClrMapping/>
+  </p:clrMapOvr>
+</p:sld>
+</file>
+
+<file path=ppt/slides/slide11.xml><?xml version="1.0" encoding="utf-8"?>
+<p:sld xmlns:a="http://schemas.openxmlformats.org/drawingml/2006/main" xmlns:r="http://schemas.openxmlformats.org/officeDocument/2006/relationships" xmlns:p="http://schemas.openxmlformats.org/presentationml/2006/main">
+  <p:cSld>
+    <p:spTree>
+      <p:nvGrpSpPr>
+        <p:cNvPr id="1" name=""/>
+        <p:cNvGrpSpPr/>
+        <p:nvPr/>
+      </p:nvGrpSpPr>
+      <p:grpSpPr>
+        <a:xfrm>
+          <a:off x="0" y="0"/>
+          <a:ext cx="0" cy="0"/>
+          <a:chOff x="0" y="0"/>
+          <a:chExt cx="0" cy="0"/>
+        </a:xfrm>
+      </p:grpSpPr>
+      <p:sp>
+        <p:nvSpPr>
+          <p:cNvPr id="2" name="Title 1"/>
+          <p:cNvSpPr>
+            <a:spLocks noGrp="1"/>
+          </p:cNvSpPr>
+          <p:nvPr>
+            <p:ph type="title"/>
+          </p:nvPr>
+        </p:nvSpPr>
+        <p:spPr/>
+        <p:txBody>
+          <a:bodyPr/>
+          <a:lstStyle/>
+          <a:p>
+            <a:r>
+              <a:rPr lang="en-US" dirty="0"/>
+              <a:t>Links</a:t>
+            </a:r>
+          </a:p>
+        </p:txBody>
+      </p:sp>
+      <p:sp>
+        <p:nvSpPr>
+          <p:cNvPr id="3" name="Content Placeholder 2"/>
+          <p:cNvSpPr>
+            <a:spLocks noGrp="1"/>
+          </p:cNvSpPr>
+          <p:nvPr>
+            <p:ph sz="half" idx="2"/>
+          </p:nvPr>
+        </p:nvSpPr>
+        <p:spPr/>
+        <p:txBody>
+          <a:bodyPr/>
+          <a:lstStyle/>
           <a:p>
             <a:pPr marL="285750" indent="-285750">
               <a:buFont typeface="Arial" panose="020B0604020202020204" pitchFamily="34" charset="0"/>
@@ -10415,7 +10491,7 @@
             </a:pPr>
             <a:r>
               <a:rPr lang="en-US" dirty="0"/>
-              <a:t>Decoding</a:t>
+              <a:t>Definition</a:t>
             </a:r>
           </a:p>
           <a:p>
@@ -10425,6 +10501,26 @@
             </a:pPr>
             <a:r>
               <a:rPr lang="en-US" dirty="0"/>
+              <a:t>https://tools.ietf.org/html/draft-ietf-oauth-json-web-token-07</a:t>
+            </a:r>
+          </a:p>
+          <a:p>
+            <a:pPr marL="285750" indent="-285750">
+              <a:buFont typeface="Arial" panose="020B0604020202020204" pitchFamily="34" charset="0"/>
+              <a:buChar char="•"/>
+            </a:pPr>
+            <a:r>
+              <a:rPr lang="en-US" dirty="0"/>
+              <a:t>Decoding</a:t>
+            </a:r>
+          </a:p>
+          <a:p>
+            <a:pPr marL="685800" lvl="1">
+              <a:buFont typeface="Arial" panose="020B0604020202020204" pitchFamily="34" charset="0"/>
+              <a:buChar char="•"/>
+            </a:pPr>
+            <a:r>
+              <a:rPr lang="en-US" dirty="0"/>
               <a:t>https://github.com/auth0/jwt-decode</a:t>
             </a:r>
           </a:p>
@@ -10500,6 +10596,16 @@
             <a:r>
               <a:rPr lang="en-US" dirty="0"/>
               <a:t>https://github.com/kkilton/jwt-demo-api</a:t>
+            </a:r>
+          </a:p>
+          <a:p>
+            <a:pPr marL="685800" lvl="1">
+              <a:buFont typeface="Arial" panose="020B0604020202020204" pitchFamily="34" charset="0"/>
+              <a:buChar char="•"/>
+            </a:pPr>
+            <a:r>
+              <a:rPr lang="en-US" dirty="0"/>
+              <a:t>https://github.com/kkilton/jwt-demo-training</a:t>
             </a:r>
           </a:p>
         </p:txBody>
@@ -10517,7 +10623,7 @@
 </p:sld>
 </file>
 
-<file path=ppt/slides/slide11.xml><?xml version="1.0" encoding="utf-8"?>
+<file path=ppt/slides/slide12.xml><?xml version="1.0" encoding="utf-8"?>
 <p:sld xmlns:a="http://schemas.openxmlformats.org/drawingml/2006/main" xmlns:r="http://schemas.openxmlformats.org/officeDocument/2006/relationships" xmlns:p="http://schemas.openxmlformats.org/presentationml/2006/main">
   <p:cSld>
     <p:spTree>
@@ -10908,6 +11014,16 @@
             </a:pPr>
             <a:r>
               <a:rPr lang="en-US" dirty="0"/>
+              <a:t>Understand why to use JWT (in the way I’ll show you)</a:t>
+            </a:r>
+          </a:p>
+          <a:p>
+            <a:pPr marL="285750" indent="-285750">
+              <a:buFont typeface="Arial" panose="020B0604020202020204" pitchFamily="34" charset="0"/>
+              <a:buChar char="•"/>
+            </a:pPr>
+            <a:r>
+              <a:rPr lang="en-US" dirty="0"/>
               <a:t>Understand basics of JWT</a:t>
             </a:r>
           </a:p>
@@ -11060,6 +11176,16 @@
             </a:r>
           </a:p>
           <a:p>
+            <a:pPr marL="685800" lvl="1">
+              <a:buFont typeface="Arial" panose="020B0604020202020204" pitchFamily="34" charset="0"/>
+              <a:buChar char="•"/>
+            </a:pPr>
+            <a:r>
+              <a:rPr lang="en-US" dirty="0"/>
+              <a:t>If you need encryption - JSON Web Encryption (JWE)</a:t>
+            </a:r>
+          </a:p>
+          <a:p>
             <a:pPr marL="285750" indent="-285750">
               <a:buFont typeface="Arial" panose="020B0604020202020204" pitchFamily="34" charset="0"/>
               <a:buChar char="•"/>
@@ -11096,8 +11222,19 @@
             </a:pPr>
             <a:r>
               <a:rPr lang="en-US" dirty="0"/>
-              <a:t>Signature – encrypted hash of header and payload</a:t>
-            </a:r>
+              <a:t>Signature – encrypted (signed) hash of header and payload</a:t>
+            </a:r>
+          </a:p>
+          <a:p>
+            <a:pPr marL="285750">
+              <a:buFont typeface="Arial" panose="020B0604020202020204" pitchFamily="34" charset="0"/>
+              <a:buChar char="•"/>
+            </a:pPr>
+            <a:r>
+              <a:rPr lang="en-US"/>
+              <a:t>SSO potential</a:t>
+            </a:r>
+            <a:endParaRPr lang="en-US" dirty="0"/>
           </a:p>
         </p:txBody>
       </p:sp>
@@ -11148,7 +11285,7 @@
           <a:p>
             <a:r>
               <a:rPr lang="en-US" dirty="0"/>
-              <a:t>ASP.NET Web API 2</a:t>
+              <a:t>JSON Web Tokens cont.</a:t>
             </a:r>
           </a:p>
         </p:txBody>
@@ -11167,143 +11304,62 @@
         <p:txBody>
           <a:bodyPr/>
           <a:lstStyle/>
-          <a:p>
-            <a:pPr marL="285750" indent="-285750">
-              <a:buFont typeface="Arial" panose="020B0604020202020204" pitchFamily="34" charset="0"/>
-              <a:buChar char="•"/>
-            </a:pPr>
-            <a:r>
-              <a:rPr lang="en-US" dirty="0"/>
-              <a:t>RESTful architecture</a:t>
-            </a:r>
-          </a:p>
-          <a:p>
-            <a:pPr marL="285750" indent="-285750">
-              <a:buFont typeface="Arial" panose="020B0604020202020204" pitchFamily="34" charset="0"/>
-              <a:buChar char="•"/>
-            </a:pPr>
-            <a:r>
-              <a:rPr lang="en-US" dirty="0"/>
-              <a:t>Support for JWT - </a:t>
-            </a:r>
-            <a:r>
-              <a:rPr lang="en-US" dirty="0" err="1"/>
-              <a:t>JwtSecurityTokenHandler</a:t>
-            </a:r>
-            <a:r>
-              <a:rPr lang="en-US" dirty="0"/>
-              <a:t> Class</a:t>
-            </a:r>
-          </a:p>
-          <a:p>
-            <a:pPr marL="685800" lvl="1">
-              <a:buFont typeface="Arial" panose="020B0604020202020204" pitchFamily="34" charset="0"/>
-              <a:buChar char="•"/>
-            </a:pPr>
-            <a:r>
-              <a:rPr lang="en-US" dirty="0"/>
-              <a:t>Install-Packages</a:t>
-            </a:r>
-          </a:p>
-          <a:p>
-            <a:pPr marL="1085850" lvl="2">
-              <a:buFont typeface="Arial" panose="020B0604020202020204" pitchFamily="34" charset="0"/>
-              <a:buChar char="•"/>
-            </a:pPr>
-            <a:r>
-              <a:rPr lang="en-US" dirty="0" err="1"/>
-              <a:t>System.IdentityModel.Tokens.Jwt</a:t>
-            </a:r>
-            <a:endParaRPr lang="en-US" dirty="0"/>
-          </a:p>
-          <a:p>
-            <a:pPr marL="1085850" lvl="2">
-              <a:buFont typeface="Arial" panose="020B0604020202020204" pitchFamily="34" charset="0"/>
-              <a:buChar char="•"/>
-            </a:pPr>
-            <a:r>
-              <a:rPr lang="en-US" dirty="0" err="1"/>
-              <a:t>Microsoft.IdentityModel.Tokens</a:t>
-            </a:r>
-            <a:endParaRPr lang="en-US" dirty="0"/>
-          </a:p>
-          <a:p>
-            <a:pPr marL="1085850" lvl="2">
-              <a:buFont typeface="Arial" panose="020B0604020202020204" pitchFamily="34" charset="0"/>
-              <a:buChar char="•"/>
-            </a:pPr>
-            <a:r>
-              <a:rPr lang="en-US" dirty="0" err="1"/>
-              <a:t>Microsoft.AspNet.WebApi.Cors</a:t>
-            </a:r>
-            <a:endParaRPr lang="en-US" dirty="0"/>
-          </a:p>
-          <a:p>
-            <a:pPr marL="285750" indent="-285750">
-              <a:buFont typeface="Arial" panose="020B0604020202020204" pitchFamily="34" charset="0"/>
-              <a:buChar char="•"/>
-            </a:pPr>
-            <a:r>
-              <a:rPr lang="en-US" dirty="0"/>
-              <a:t>Use filters for lifecycle injection</a:t>
-            </a:r>
-          </a:p>
-          <a:p>
-            <a:pPr marL="685800" lvl="1">
-              <a:buFont typeface="Arial" panose="020B0604020202020204" pitchFamily="34" charset="0"/>
-              <a:buChar char="•"/>
-            </a:pPr>
-            <a:r>
-              <a:rPr lang="en-US" dirty="0" err="1"/>
-              <a:t>AuthorizationFilter</a:t>
-            </a:r>
-            <a:endParaRPr lang="en-US" dirty="0"/>
-          </a:p>
-          <a:p>
-            <a:pPr marL="685800" lvl="1">
-              <a:buFont typeface="Arial" panose="020B0604020202020204" pitchFamily="34" charset="0"/>
-              <a:buChar char="•"/>
-            </a:pPr>
-            <a:r>
-              <a:rPr lang="en-US" dirty="0"/>
-              <a:t> </a:t>
-            </a:r>
-            <a:r>
-              <a:rPr lang="en-US" dirty="0" err="1"/>
-              <a:t>ActionFilter</a:t>
-            </a:r>
-            <a:endParaRPr lang="en-US" dirty="0"/>
-          </a:p>
-          <a:p>
-            <a:pPr marL="1085850" lvl="2">
-              <a:buFont typeface="Arial" panose="020B0604020202020204" pitchFamily="34" charset="0"/>
-              <a:buChar char="•"/>
-            </a:pPr>
-            <a:r>
-              <a:rPr lang="en-US" dirty="0" err="1"/>
-              <a:t>OnActionExecuted</a:t>
-            </a:r>
-            <a:r>
-              <a:rPr lang="en-US" dirty="0"/>
-              <a:t> - Renew token	</a:t>
-            </a:r>
-          </a:p>
           <a:p>
             <a:pPr marL="285750">
               <a:buFont typeface="Arial" panose="020B0604020202020204" pitchFamily="34" charset="0"/>
               <a:buChar char="•"/>
             </a:pPr>
             <a:r>
-              <a:rPr lang="en-US" dirty="0"/>
-              <a:t>Authorize Attribute</a:t>
-            </a:r>
-          </a:p>
-        </p:txBody>
-      </p:sp>
+              <a:rPr lang="en-US" dirty="0">
+                <a:hlinkClick r:id="rId2"/>
+              </a:rPr>
+              <a:t>https://jwt.io/</a:t>
+            </a:r>
+            <a:endParaRPr lang="en-US" dirty="0"/>
+          </a:p>
+          <a:p>
+            <a:pPr marL="285750">
+              <a:buFont typeface="Arial" panose="020B0604020202020204" pitchFamily="34" charset="0"/>
+              <a:buChar char="•"/>
+            </a:pPr>
+            <a:endParaRPr lang="en-US" dirty="0"/>
+          </a:p>
+        </p:txBody>
+      </p:sp>
+      <p:pic>
+        <p:nvPicPr>
+          <p:cNvPr id="4" name="Picture 3">
+            <a:extLst>
+              <a:ext uri="{FF2B5EF4-FFF2-40B4-BE49-F238E27FC236}">
+                <a16:creationId xmlns:a16="http://schemas.microsoft.com/office/drawing/2014/main" id="{DDA8390A-7730-4630-B06B-BB9EE70703ED}"/>
+              </a:ext>
+            </a:extLst>
+          </p:cNvPr>
+          <p:cNvPicPr>
+            <a:picLocks noChangeAspect="1"/>
+          </p:cNvPicPr>
+          <p:nvPr/>
+        </p:nvPicPr>
+        <p:blipFill>
+          <a:blip r:embed="rId3"/>
+          <a:stretch>
+            <a:fillRect/>
+          </a:stretch>
+        </p:blipFill>
+        <p:spPr>
+          <a:xfrm>
+            <a:off x="974036" y="1970994"/>
+            <a:ext cx="6223966" cy="3708173"/>
+          </a:xfrm>
+          <a:prstGeom prst="rect">
+            <a:avLst/>
+          </a:prstGeom>
+        </p:spPr>
+      </p:pic>
     </p:spTree>
     <p:extLst>
       <p:ext uri="{BB962C8B-B14F-4D97-AF65-F5344CB8AC3E}">
-        <p14:creationId xmlns:p14="http://schemas.microsoft.com/office/powerpoint/2010/main" val="1249677060"/>
+        <p14:creationId xmlns:p14="http://schemas.microsoft.com/office/powerpoint/2010/main" val="2524318488"/>
       </p:ext>
     </p:extLst>
   </p:cSld>
@@ -11347,7 +11403,7 @@
           <a:p>
             <a:r>
               <a:rPr lang="en-US" dirty="0"/>
-              <a:t>Angular 5</a:t>
+              <a:t>ASP.NET Web API 2</a:t>
             </a:r>
           </a:p>
         </p:txBody>
@@ -11373,7 +11429,7 @@
             </a:pPr>
             <a:r>
               <a:rPr lang="en-US" dirty="0"/>
-              <a:t>Decode Token’s payload using base 64 Unicode</a:t>
+              <a:t>RESTful architecture</a:t>
             </a:r>
           </a:p>
           <a:p>
@@ -11382,12 +11438,16 @@
               <a:buChar char="•"/>
             </a:pPr>
             <a:r>
+              <a:rPr lang="en-US" dirty="0"/>
+              <a:t>Support for JWT - </a:t>
+            </a:r>
+            <a:r>
               <a:rPr lang="en-US" dirty="0" err="1"/>
-              <a:t>HttpInterceptor</a:t>
+              <a:t>JwtSecurityTokenHandler</a:t>
             </a:r>
             <a:r>
               <a:rPr lang="en-US" dirty="0"/>
-              <a:t> since 4.3</a:t>
+              <a:t> Class</a:t>
             </a:r>
           </a:p>
           <a:p>
@@ -11397,7 +11457,50 @@
             </a:pPr>
             <a:r>
               <a:rPr lang="en-US" dirty="0"/>
-              <a:t>Request</a:t>
+              <a:t>Install-Packages</a:t>
+            </a:r>
+          </a:p>
+          <a:p>
+            <a:pPr marL="1085850" lvl="2">
+              <a:buFont typeface="Arial" panose="020B0604020202020204" pitchFamily="34" charset="0"/>
+              <a:buChar char="•"/>
+            </a:pPr>
+            <a:r>
+              <a:rPr lang="en-US" dirty="0" err="1"/>
+              <a:t>System.IdentityModel.Tokens.Jwt</a:t>
+            </a:r>
+            <a:endParaRPr lang="en-US" dirty="0"/>
+          </a:p>
+          <a:p>
+            <a:pPr marL="1085850" lvl="2">
+              <a:buFont typeface="Arial" panose="020B0604020202020204" pitchFamily="34" charset="0"/>
+              <a:buChar char="•"/>
+            </a:pPr>
+            <a:r>
+              <a:rPr lang="en-US" dirty="0" err="1"/>
+              <a:t>Microsoft.IdentityModel.Tokens</a:t>
+            </a:r>
+            <a:endParaRPr lang="en-US" dirty="0"/>
+          </a:p>
+          <a:p>
+            <a:pPr marL="1085850" lvl="2">
+              <a:buFont typeface="Arial" panose="020B0604020202020204" pitchFamily="34" charset="0"/>
+              <a:buChar char="•"/>
+            </a:pPr>
+            <a:r>
+              <a:rPr lang="en-US" dirty="0" err="1"/>
+              <a:t>Microsoft.AspNet.WebApi.Cors</a:t>
+            </a:r>
+            <a:endParaRPr lang="en-US" dirty="0"/>
+          </a:p>
+          <a:p>
+            <a:pPr marL="285750" indent="-285750">
+              <a:buFont typeface="Arial" panose="020B0604020202020204" pitchFamily="34" charset="0"/>
+              <a:buChar char="•"/>
+            </a:pPr>
+            <a:r>
+              <a:rPr lang="en-US" dirty="0"/>
+              <a:t>Use filters for lifecycle injection</a:t>
             </a:r>
           </a:p>
           <a:p>
@@ -11406,40 +11509,56 @@
               <a:buChar char="•"/>
             </a:pPr>
             <a:r>
-              <a:rPr lang="en-US" dirty="0"/>
-              <a:t>Response</a:t>
-            </a:r>
-          </a:p>
-          <a:p>
-            <a:pPr marL="285750" indent="-285750">
+              <a:rPr lang="en-US" dirty="0" err="1"/>
+              <a:t>AuthorizationFilter</a:t>
+            </a:r>
+            <a:endParaRPr lang="en-US" dirty="0"/>
+          </a:p>
+          <a:p>
+            <a:pPr marL="685800" lvl="1">
               <a:buFont typeface="Arial" panose="020B0604020202020204" pitchFamily="34" charset="0"/>
               <a:buChar char="•"/>
             </a:pPr>
             <a:r>
               <a:rPr lang="en-US" dirty="0"/>
-              <a:t>Router Guards</a:t>
-            </a:r>
-          </a:p>
-          <a:p>
-            <a:pPr marL="285750" indent="-285750">
+              <a:t> </a:t>
+            </a:r>
+            <a:r>
+              <a:rPr lang="en-US" dirty="0" err="1"/>
+              <a:t>ActionFilter</a:t>
+            </a:r>
+            <a:endParaRPr lang="en-US" dirty="0"/>
+          </a:p>
+          <a:p>
+            <a:pPr marL="1085850" lvl="2">
               <a:buFont typeface="Arial" panose="020B0604020202020204" pitchFamily="34" charset="0"/>
               <a:buChar char="•"/>
             </a:pPr>
-            <a:endParaRPr lang="en-US" dirty="0"/>
-          </a:p>
-          <a:p>
-            <a:pPr marL="285750" indent="-285750">
+            <a:r>
+              <a:rPr lang="en-US" dirty="0" err="1"/>
+              <a:t>OnActionExecuted</a:t>
+            </a:r>
+            <a:r>
+              <a:rPr lang="en-US" dirty="0"/>
+              <a:t> - Renew token	</a:t>
+            </a:r>
+          </a:p>
+          <a:p>
+            <a:pPr marL="285750">
               <a:buFont typeface="Arial" panose="020B0604020202020204" pitchFamily="34" charset="0"/>
               <a:buChar char="•"/>
             </a:pPr>
-            <a:endParaRPr lang="en-US" dirty="0"/>
+            <a:r>
+              <a:rPr lang="en-US" dirty="0"/>
+              <a:t>Authorize Attribute</a:t>
+            </a:r>
           </a:p>
         </p:txBody>
       </p:sp>
     </p:spTree>
     <p:extLst>
       <p:ext uri="{BB962C8B-B14F-4D97-AF65-F5344CB8AC3E}">
-        <p14:creationId xmlns:p14="http://schemas.microsoft.com/office/powerpoint/2010/main" val="4228634820"/>
+        <p14:creationId xmlns:p14="http://schemas.microsoft.com/office/powerpoint/2010/main" val="1249677060"/>
       </p:ext>
     </p:extLst>
   </p:cSld>
@@ -11483,7 +11602,7 @@
           <a:p>
             <a:r>
               <a:rPr lang="en-US" dirty="0"/>
-              <a:t>Workflow</a:t>
+              <a:t>Angular 5</a:t>
             </a:r>
           </a:p>
         </p:txBody>
@@ -11509,7 +11628,21 @@
             </a:pPr>
             <a:r>
               <a:rPr lang="en-US" dirty="0"/>
-              <a:t>UI – Login</a:t>
+              <a:t>Decode Token’s payload using base 64 Unicode</a:t>
+            </a:r>
+          </a:p>
+          <a:p>
+            <a:pPr marL="285750" indent="-285750">
+              <a:buFont typeface="Arial" panose="020B0604020202020204" pitchFamily="34" charset="0"/>
+              <a:buChar char="•"/>
+            </a:pPr>
+            <a:r>
+              <a:rPr lang="en-US" dirty="0" err="1"/>
+              <a:t>HttpInterceptor</a:t>
+            </a:r>
+            <a:r>
+              <a:rPr lang="en-US" dirty="0"/>
+              <a:t> since 4.3</a:t>
             </a:r>
           </a:p>
           <a:p>
@@ -11519,17 +11652,7 @@
             </a:pPr>
             <a:r>
               <a:rPr lang="en-US" dirty="0"/>
-              <a:t>API – authenticate user</a:t>
-            </a:r>
-          </a:p>
-          <a:p>
-            <a:pPr marL="1085850" lvl="2">
-              <a:buFont typeface="Arial" panose="020B0604020202020204" pitchFamily="34" charset="0"/>
-              <a:buChar char="•"/>
-            </a:pPr>
-            <a:r>
-              <a:rPr lang="en-US" dirty="0"/>
-              <a:t>Respond with token</a:t>
+              <a:t>Request</a:t>
             </a:r>
           </a:p>
           <a:p>
@@ -11539,75 +11662,39 @@
             </a:pPr>
             <a:r>
               <a:rPr lang="en-US" dirty="0"/>
-              <a:t>UI – Store token</a:t>
-            </a:r>
-          </a:p>
-          <a:p>
-            <a:pPr marL="285750">
+              <a:t>Response</a:t>
+            </a:r>
+          </a:p>
+          <a:p>
+            <a:pPr marL="285750" indent="-285750">
               <a:buFont typeface="Arial" panose="020B0604020202020204" pitchFamily="34" charset="0"/>
               <a:buChar char="•"/>
             </a:pPr>
             <a:r>
               <a:rPr lang="en-US" dirty="0"/>
-              <a:t>UI – request resource</a:t>
-            </a:r>
-          </a:p>
-          <a:p>
-            <a:pPr marL="685800" lvl="1">
+              <a:t>Router Guards</a:t>
+            </a:r>
+          </a:p>
+          <a:p>
+            <a:pPr marL="285750" indent="-285750">
               <a:buFont typeface="Arial" panose="020B0604020202020204" pitchFamily="34" charset="0"/>
               <a:buChar char="•"/>
             </a:pPr>
-            <a:r>
-              <a:rPr lang="en-US" dirty="0"/>
-              <a:t>Send token in header</a:t>
-            </a:r>
-          </a:p>
-          <a:p>
-            <a:pPr marL="685800" lvl="1">
+            <a:endParaRPr lang="en-US" dirty="0"/>
+          </a:p>
+          <a:p>
+            <a:pPr marL="285750" indent="-285750">
               <a:buFont typeface="Arial" panose="020B0604020202020204" pitchFamily="34" charset="0"/>
               <a:buChar char="•"/>
             </a:pPr>
-            <a:r>
-              <a:rPr lang="en-US" dirty="0"/>
-              <a:t>API – validate token</a:t>
-            </a:r>
-          </a:p>
-          <a:p>
-            <a:pPr marL="1085850" lvl="2">
-              <a:buFont typeface="Arial" panose="020B0604020202020204" pitchFamily="34" charset="0"/>
-              <a:buChar char="•"/>
-            </a:pPr>
-            <a:r>
-              <a:rPr lang="en-US" dirty="0"/>
-              <a:t>Do request</a:t>
-            </a:r>
-          </a:p>
-          <a:p>
-            <a:pPr marL="1085850" lvl="2">
-              <a:buFont typeface="Arial" panose="020B0604020202020204" pitchFamily="34" charset="0"/>
-              <a:buChar char="•"/>
-            </a:pPr>
-            <a:r>
-              <a:rPr lang="en-US" dirty="0"/>
-              <a:t>Renew token and send it back in the header</a:t>
-            </a:r>
-          </a:p>
-          <a:p>
-            <a:pPr marL="685800" lvl="1">
-              <a:buFont typeface="Arial" panose="020B0604020202020204" pitchFamily="34" charset="0"/>
-              <a:buChar char="•"/>
-            </a:pPr>
-            <a:r>
-              <a:rPr lang="en-US" dirty="0"/>
-              <a:t>UI – store new token</a:t>
-            </a:r>
+            <a:endParaRPr lang="en-US" dirty="0"/>
           </a:p>
         </p:txBody>
       </p:sp>
     </p:spTree>
     <p:extLst>
       <p:ext uri="{BB962C8B-B14F-4D97-AF65-F5344CB8AC3E}">
-        <p14:creationId xmlns:p14="http://schemas.microsoft.com/office/powerpoint/2010/main" val="1026205944"/>
+        <p14:creationId xmlns:p14="http://schemas.microsoft.com/office/powerpoint/2010/main" val="4228634820"/>
       </p:ext>
     </p:extLst>
   </p:cSld>
@@ -11651,7 +11738,123 @@
           <a:p>
             <a:r>
               <a:rPr lang="en-US" dirty="0"/>
-              <a:t>Demo</a:t>
+              <a:t>Workflow</a:t>
+            </a:r>
+          </a:p>
+        </p:txBody>
+      </p:sp>
+      <p:sp>
+        <p:nvSpPr>
+          <p:cNvPr id="3" name="Content Placeholder 2"/>
+          <p:cNvSpPr>
+            <a:spLocks noGrp="1"/>
+          </p:cNvSpPr>
+          <p:nvPr>
+            <p:ph sz="half" idx="2"/>
+          </p:nvPr>
+        </p:nvSpPr>
+        <p:spPr/>
+        <p:txBody>
+          <a:bodyPr/>
+          <a:lstStyle/>
+          <a:p>
+            <a:pPr marL="285750" indent="-285750">
+              <a:buFont typeface="Arial" panose="020B0604020202020204" pitchFamily="34" charset="0"/>
+              <a:buChar char="•"/>
+            </a:pPr>
+            <a:r>
+              <a:rPr lang="en-US" dirty="0"/>
+              <a:t>UI – Login</a:t>
+            </a:r>
+          </a:p>
+          <a:p>
+            <a:pPr marL="685800" lvl="1">
+              <a:buFont typeface="Arial" panose="020B0604020202020204" pitchFamily="34" charset="0"/>
+              <a:buChar char="•"/>
+            </a:pPr>
+            <a:r>
+              <a:rPr lang="en-US" dirty="0"/>
+              <a:t>API – authenticate user</a:t>
+            </a:r>
+          </a:p>
+          <a:p>
+            <a:pPr marL="1085850" lvl="2">
+              <a:buFont typeface="Arial" panose="020B0604020202020204" pitchFamily="34" charset="0"/>
+              <a:buChar char="•"/>
+            </a:pPr>
+            <a:r>
+              <a:rPr lang="en-US" dirty="0"/>
+              <a:t>Respond with token</a:t>
+            </a:r>
+          </a:p>
+          <a:p>
+            <a:pPr marL="685800" lvl="1">
+              <a:buFont typeface="Arial" panose="020B0604020202020204" pitchFamily="34" charset="0"/>
+              <a:buChar char="•"/>
+            </a:pPr>
+            <a:r>
+              <a:rPr lang="en-US" dirty="0"/>
+              <a:t>UI – Store token</a:t>
+            </a:r>
+          </a:p>
+          <a:p>
+            <a:pPr marL="285750">
+              <a:buFont typeface="Arial" panose="020B0604020202020204" pitchFamily="34" charset="0"/>
+              <a:buChar char="•"/>
+            </a:pPr>
+            <a:r>
+              <a:rPr lang="en-US" dirty="0"/>
+              <a:t>UI – request resource</a:t>
+            </a:r>
+          </a:p>
+          <a:p>
+            <a:pPr marL="685800" lvl="1">
+              <a:buFont typeface="Arial" panose="020B0604020202020204" pitchFamily="34" charset="0"/>
+              <a:buChar char="•"/>
+            </a:pPr>
+            <a:r>
+              <a:rPr lang="en-US" dirty="0"/>
+              <a:t>Send token in header</a:t>
+            </a:r>
+          </a:p>
+          <a:p>
+            <a:pPr marL="685800" lvl="1">
+              <a:buFont typeface="Arial" panose="020B0604020202020204" pitchFamily="34" charset="0"/>
+              <a:buChar char="•"/>
+            </a:pPr>
+            <a:r>
+              <a:rPr lang="en-US" dirty="0"/>
+              <a:t>API – validate token</a:t>
+            </a:r>
+          </a:p>
+          <a:p>
+            <a:pPr marL="1085850" lvl="2">
+              <a:buFont typeface="Arial" panose="020B0604020202020204" pitchFamily="34" charset="0"/>
+              <a:buChar char="•"/>
+            </a:pPr>
+            <a:r>
+              <a:rPr lang="en-US" dirty="0"/>
+              <a:t>Do request</a:t>
+            </a:r>
+          </a:p>
+          <a:p>
+            <a:pPr marL="1085850" lvl="2">
+              <a:buFont typeface="Arial" panose="020B0604020202020204" pitchFamily="34" charset="0"/>
+              <a:buChar char="•"/>
+            </a:pPr>
+            <a:r>
+              <a:rPr lang="en-US" dirty="0"/>
+              <a:t>Renew token and send it back in the header</a:t>
+            </a:r>
+          </a:p>
+          <a:p>
+            <a:pPr marL="685800" lvl="1">
+              <a:buFont typeface="Arial" panose="020B0604020202020204" pitchFamily="34" charset="0"/>
+              <a:buChar char="•"/>
+            </a:pPr>
+            <a:r>
+              <a:rPr lang="en-US" dirty="0"/>
+              <a:t>UI – store new token</a:t>
             </a:r>
           </a:p>
         </p:txBody>
@@ -11659,7 +11862,7 @@
     </p:spTree>
     <p:extLst>
       <p:ext uri="{BB962C8B-B14F-4D97-AF65-F5344CB8AC3E}">
-        <p14:creationId xmlns:p14="http://schemas.microsoft.com/office/powerpoint/2010/main" val="2995966448"/>
+        <p14:creationId xmlns:p14="http://schemas.microsoft.com/office/powerpoint/2010/main" val="1026205944"/>
       </p:ext>
     </p:extLst>
   </p:cSld>
@@ -11696,56 +11899,35 @@
             <p:ph type="title"/>
           </p:nvPr>
         </p:nvSpPr>
-        <p:spPr/>
-        <p:txBody>
-          <a:bodyPr/>
+        <p:spPr>
+          <a:xfrm>
+            <a:off x="457200" y="274637"/>
+            <a:ext cx="8229600" cy="2110753"/>
+          </a:xfrm>
+        </p:spPr>
+        <p:txBody>
+          <a:bodyPr>
+            <a:normAutofit fontScale="90000"/>
+          </a:bodyPr>
           <a:lstStyle/>
           <a:p>
             <a:r>
               <a:rPr lang="en-US" dirty="0"/>
-              <a:t>Other security to consider</a:t>
-            </a:r>
-          </a:p>
-        </p:txBody>
-      </p:sp>
-      <p:sp>
-        <p:nvSpPr>
-          <p:cNvPr id="3" name="Content Placeholder 2"/>
-          <p:cNvSpPr>
-            <a:spLocks noGrp="1"/>
-          </p:cNvSpPr>
-          <p:nvPr>
-            <p:ph sz="half" idx="2"/>
-          </p:nvPr>
-        </p:nvSpPr>
-        <p:spPr/>
-        <p:txBody>
-          <a:bodyPr/>
-          <a:lstStyle/>
-          <a:p>
-            <a:pPr marL="285750" indent="-285750">
-              <a:buFont typeface="Arial" panose="020B0604020202020204" pitchFamily="34" charset="0"/>
-              <a:buChar char="•"/>
-            </a:pPr>
-            <a:r>
+              <a:t>Demo</a:t>
+            </a:r>
+            <a:br>
               <a:rPr lang="en-US" dirty="0"/>
-              <a:t>Logical security in UI and API</a:t>
-            </a:r>
-          </a:p>
-          <a:p>
-            <a:pPr marL="685800" lvl="1">
-              <a:buFont typeface="Arial" panose="020B0604020202020204" pitchFamily="34" charset="0"/>
-              <a:buChar char="•"/>
-            </a:pPr>
-            <a:r>
+            </a:br>
+            <a:br>
               <a:rPr lang="en-US" dirty="0"/>
-              <a:t>/customer/1234/order/4567</a:t>
-            </a:r>
-          </a:p>
-          <a:p>
-            <a:pPr marL="0" indent="0">
-              <a:buNone/>
-            </a:pPr>
+            </a:br>
+            <a:r>
+              <a:rPr lang="en-US" dirty="0"/>
+              <a:t>This example details setting up a secure website without a dedicated token server</a:t>
+            </a:r>
+            <a:br>
+              <a:rPr lang="en-US" dirty="0"/>
+            </a:br>
             <a:endParaRPr lang="en-US" dirty="0"/>
           </a:p>
         </p:txBody>
@@ -11753,7 +11935,7 @@
     </p:spTree>
     <p:extLst>
       <p:ext uri="{BB962C8B-B14F-4D97-AF65-F5344CB8AC3E}">
-        <p14:creationId xmlns:p14="http://schemas.microsoft.com/office/powerpoint/2010/main" val="4085759445"/>
+        <p14:creationId xmlns:p14="http://schemas.microsoft.com/office/powerpoint/2010/main" val="2995966448"/>
       </p:ext>
     </p:extLst>
   </p:cSld>

</xml_diff>